<commit_message>
fix: refactoring to uqtils package
</commit_message>
<xml_diff>
--- a/docs/assets/amisc_logo.pptx
+++ b/docs/assets/amisc_logo.pptx
@@ -270,7 +270,7 @@
           <a:p>
             <a:fld id="{F515D759-778E-43C4-99E7-E1ADCF2103B8}" type="datetimeFigureOut">
               <a:rPr lang="en-US" smtClean="0"/>
-              <a:t>12/5/2023</a:t>
+              <a:t>1/26/2024</a:t>
             </a:fld>
             <a:endParaRPr lang="en-US"/>
           </a:p>
@@ -468,7 +468,7 @@
           <a:p>
             <a:fld id="{F515D759-778E-43C4-99E7-E1ADCF2103B8}" type="datetimeFigureOut">
               <a:rPr lang="en-US" smtClean="0"/>
-              <a:t>12/5/2023</a:t>
+              <a:t>1/26/2024</a:t>
             </a:fld>
             <a:endParaRPr lang="en-US"/>
           </a:p>
@@ -676,7 +676,7 @@
           <a:p>
             <a:fld id="{F515D759-778E-43C4-99E7-E1ADCF2103B8}" type="datetimeFigureOut">
               <a:rPr lang="en-US" smtClean="0"/>
-              <a:t>12/5/2023</a:t>
+              <a:t>1/26/2024</a:t>
             </a:fld>
             <a:endParaRPr lang="en-US"/>
           </a:p>
@@ -874,7 +874,7 @@
           <a:p>
             <a:fld id="{F515D759-778E-43C4-99E7-E1ADCF2103B8}" type="datetimeFigureOut">
               <a:rPr lang="en-US" smtClean="0"/>
-              <a:t>12/5/2023</a:t>
+              <a:t>1/26/2024</a:t>
             </a:fld>
             <a:endParaRPr lang="en-US"/>
           </a:p>
@@ -1149,7 +1149,7 @@
           <a:p>
             <a:fld id="{F515D759-778E-43C4-99E7-E1ADCF2103B8}" type="datetimeFigureOut">
               <a:rPr lang="en-US" smtClean="0"/>
-              <a:t>12/5/2023</a:t>
+              <a:t>1/26/2024</a:t>
             </a:fld>
             <a:endParaRPr lang="en-US"/>
           </a:p>
@@ -1414,7 +1414,7 @@
           <a:p>
             <a:fld id="{F515D759-778E-43C4-99E7-E1ADCF2103B8}" type="datetimeFigureOut">
               <a:rPr lang="en-US" smtClean="0"/>
-              <a:t>12/5/2023</a:t>
+              <a:t>1/26/2024</a:t>
             </a:fld>
             <a:endParaRPr lang="en-US"/>
           </a:p>
@@ -1826,7 +1826,7 @@
           <a:p>
             <a:fld id="{F515D759-778E-43C4-99E7-E1ADCF2103B8}" type="datetimeFigureOut">
               <a:rPr lang="en-US" smtClean="0"/>
-              <a:t>12/5/2023</a:t>
+              <a:t>1/26/2024</a:t>
             </a:fld>
             <a:endParaRPr lang="en-US"/>
           </a:p>
@@ -1967,7 +1967,7 @@
           <a:p>
             <a:fld id="{F515D759-778E-43C4-99E7-E1ADCF2103B8}" type="datetimeFigureOut">
               <a:rPr lang="en-US" smtClean="0"/>
-              <a:t>12/5/2023</a:t>
+              <a:t>1/26/2024</a:t>
             </a:fld>
             <a:endParaRPr lang="en-US"/>
           </a:p>
@@ -2080,7 +2080,7 @@
           <a:p>
             <a:fld id="{F515D759-778E-43C4-99E7-E1ADCF2103B8}" type="datetimeFigureOut">
               <a:rPr lang="en-US" smtClean="0"/>
-              <a:t>12/5/2023</a:t>
+              <a:t>1/26/2024</a:t>
             </a:fld>
             <a:endParaRPr lang="en-US"/>
           </a:p>
@@ -2391,7 +2391,7 @@
           <a:p>
             <a:fld id="{F515D759-778E-43C4-99E7-E1ADCF2103B8}" type="datetimeFigureOut">
               <a:rPr lang="en-US" smtClean="0"/>
-              <a:t>12/5/2023</a:t>
+              <a:t>1/26/2024</a:t>
             </a:fld>
             <a:endParaRPr lang="en-US"/>
           </a:p>
@@ -2679,7 +2679,7 @@
           <a:p>
             <a:fld id="{F515D759-778E-43C4-99E7-E1ADCF2103B8}" type="datetimeFigureOut">
               <a:rPr lang="en-US" smtClean="0"/>
-              <a:t>12/5/2023</a:t>
+              <a:t>1/26/2024</a:t>
             </a:fld>
             <a:endParaRPr lang="en-US"/>
           </a:p>
@@ -2920,7 +2920,7 @@
           <a:p>
             <a:fld id="{F515D759-778E-43C4-99E7-E1ADCF2103B8}" type="datetimeFigureOut">
               <a:rPr lang="en-US" smtClean="0"/>
-              <a:t>12/5/2023</a:t>
+              <a:t>1/26/2024</a:t>
             </a:fld>
             <a:endParaRPr lang="en-US"/>
           </a:p>

</xml_diff>

<commit_message>
Refactoring to uqtils package (#14)
* fix: minor fixes

* fix: refactoring to uqtils package
</commit_message>
<xml_diff>
--- a/docs/assets/amisc_logo.pptx
+++ b/docs/assets/amisc_logo.pptx
@@ -270,7 +270,7 @@
           <a:p>
             <a:fld id="{F515D759-778E-43C4-99E7-E1ADCF2103B8}" type="datetimeFigureOut">
               <a:rPr lang="en-US" smtClean="0"/>
-              <a:t>12/5/2023</a:t>
+              <a:t>1/26/2024</a:t>
             </a:fld>
             <a:endParaRPr lang="en-US"/>
           </a:p>
@@ -468,7 +468,7 @@
           <a:p>
             <a:fld id="{F515D759-778E-43C4-99E7-E1ADCF2103B8}" type="datetimeFigureOut">
               <a:rPr lang="en-US" smtClean="0"/>
-              <a:t>12/5/2023</a:t>
+              <a:t>1/26/2024</a:t>
             </a:fld>
             <a:endParaRPr lang="en-US"/>
           </a:p>
@@ -676,7 +676,7 @@
           <a:p>
             <a:fld id="{F515D759-778E-43C4-99E7-E1ADCF2103B8}" type="datetimeFigureOut">
               <a:rPr lang="en-US" smtClean="0"/>
-              <a:t>12/5/2023</a:t>
+              <a:t>1/26/2024</a:t>
             </a:fld>
             <a:endParaRPr lang="en-US"/>
           </a:p>
@@ -874,7 +874,7 @@
           <a:p>
             <a:fld id="{F515D759-778E-43C4-99E7-E1ADCF2103B8}" type="datetimeFigureOut">
               <a:rPr lang="en-US" smtClean="0"/>
-              <a:t>12/5/2023</a:t>
+              <a:t>1/26/2024</a:t>
             </a:fld>
             <a:endParaRPr lang="en-US"/>
           </a:p>
@@ -1149,7 +1149,7 @@
           <a:p>
             <a:fld id="{F515D759-778E-43C4-99E7-E1ADCF2103B8}" type="datetimeFigureOut">
               <a:rPr lang="en-US" smtClean="0"/>
-              <a:t>12/5/2023</a:t>
+              <a:t>1/26/2024</a:t>
             </a:fld>
             <a:endParaRPr lang="en-US"/>
           </a:p>
@@ -1414,7 +1414,7 @@
           <a:p>
             <a:fld id="{F515D759-778E-43C4-99E7-E1ADCF2103B8}" type="datetimeFigureOut">
               <a:rPr lang="en-US" smtClean="0"/>
-              <a:t>12/5/2023</a:t>
+              <a:t>1/26/2024</a:t>
             </a:fld>
             <a:endParaRPr lang="en-US"/>
           </a:p>
@@ -1826,7 +1826,7 @@
           <a:p>
             <a:fld id="{F515D759-778E-43C4-99E7-E1ADCF2103B8}" type="datetimeFigureOut">
               <a:rPr lang="en-US" smtClean="0"/>
-              <a:t>12/5/2023</a:t>
+              <a:t>1/26/2024</a:t>
             </a:fld>
             <a:endParaRPr lang="en-US"/>
           </a:p>
@@ -1967,7 +1967,7 @@
           <a:p>
             <a:fld id="{F515D759-778E-43C4-99E7-E1ADCF2103B8}" type="datetimeFigureOut">
               <a:rPr lang="en-US" smtClean="0"/>
-              <a:t>12/5/2023</a:t>
+              <a:t>1/26/2024</a:t>
             </a:fld>
             <a:endParaRPr lang="en-US"/>
           </a:p>
@@ -2080,7 +2080,7 @@
           <a:p>
             <a:fld id="{F515D759-778E-43C4-99E7-E1ADCF2103B8}" type="datetimeFigureOut">
               <a:rPr lang="en-US" smtClean="0"/>
-              <a:t>12/5/2023</a:t>
+              <a:t>1/26/2024</a:t>
             </a:fld>
             <a:endParaRPr lang="en-US"/>
           </a:p>
@@ -2391,7 +2391,7 @@
           <a:p>
             <a:fld id="{F515D759-778E-43C4-99E7-E1ADCF2103B8}" type="datetimeFigureOut">
               <a:rPr lang="en-US" smtClean="0"/>
-              <a:t>12/5/2023</a:t>
+              <a:t>1/26/2024</a:t>
             </a:fld>
             <a:endParaRPr lang="en-US"/>
           </a:p>
@@ -2679,7 +2679,7 @@
           <a:p>
             <a:fld id="{F515D759-778E-43C4-99E7-E1ADCF2103B8}" type="datetimeFigureOut">
               <a:rPr lang="en-US" smtClean="0"/>
-              <a:t>12/5/2023</a:t>
+              <a:t>1/26/2024</a:t>
             </a:fld>
             <a:endParaRPr lang="en-US"/>
           </a:p>
@@ -2920,7 +2920,7 @@
           <a:p>
             <a:fld id="{F515D759-778E-43C4-99E7-E1ADCF2103B8}" type="datetimeFigureOut">
               <a:rPr lang="en-US" smtClean="0"/>
-              <a:t>12/5/2023</a:t>
+              <a:t>1/26/2024</a:t>
             </a:fld>
             <a:endParaRPr lang="en-US"/>
           </a:p>

</xml_diff>